<commit_message>
update week 01 materials
</commit_message>
<xml_diff>
--- a/docs/Lectures/Week02/Week02_Intro.pptx
+++ b/docs/Lectures/Week02/Week02_Intro.pptx
@@ -6,14 +6,9 @@
   </p:sldMasterIdLst>
   <p:sldIdLst>
     <p:sldId id="256" r:id="rId2"/>
-    <p:sldId id="257" r:id="rId3"/>
-    <p:sldId id="260" r:id="rId4"/>
-    <p:sldId id="258" r:id="rId5"/>
-    <p:sldId id="259" r:id="rId6"/>
-    <p:sldId id="261" r:id="rId7"/>
-    <p:sldId id="262" r:id="rId8"/>
-    <p:sldId id="263" r:id="rId9"/>
-    <p:sldId id="264" r:id="rId10"/>
+    <p:sldId id="262" r:id="rId3"/>
+    <p:sldId id="263" r:id="rId4"/>
+    <p:sldId id="264" r:id="rId5"/>
   </p:sldIdLst>
   <p:sldSz cx="12192000" cy="6858000"/>
   <p:notesSz cx="6858000" cy="9144000"/>
@@ -358,7 +353,7 @@
           <a:p>
             <a:fld id="{ED291B17-9318-49DB-B28B-6E5994AE9581}" type="datetime1">
               <a:rPr lang="en-US" smtClean="0"/>
-              <a:t>12/12/2024</a:t>
+              <a:t>1/2/2025</a:t>
             </a:fld>
             <a:endParaRPr lang="en-US" dirty="0"/>
           </a:p>
@@ -561,7 +556,7 @@
           <a:p>
             <a:fld id="{2CED4963-E985-44C4-B8C4-FDD613B7C2F8}" type="datetime1">
               <a:rPr lang="en-US" smtClean="0"/>
-              <a:t>12/12/2024</a:t>
+              <a:t>1/2/2025</a:t>
             </a:fld>
             <a:endParaRPr lang="en-US" dirty="0"/>
           </a:p>
@@ -923,7 +918,7 @@
           <a:p>
             <a:fld id="{ED291B17-9318-49DB-B28B-6E5994AE9581}" type="datetime1">
               <a:rPr lang="en-US" smtClean="0"/>
-              <a:t>12/12/2024</a:t>
+              <a:t>1/2/2025</a:t>
             </a:fld>
             <a:endParaRPr lang="en-US" dirty="0"/>
           </a:p>
@@ -1121,7 +1116,7 @@
           <a:p>
             <a:fld id="{78DD82B9-B8EE-4375-B6FF-88FA6ABB15D9}" type="datetime1">
               <a:rPr lang="en-US" smtClean="0"/>
-              <a:t>12/12/2024</a:t>
+              <a:t>1/2/2025</a:t>
             </a:fld>
             <a:endParaRPr lang="en-US" dirty="0"/>
           </a:p>
@@ -1433,7 +1428,7 @@
           <a:p>
             <a:fld id="{B2497495-0637-405E-AE64-5CC7506D51F5}" type="datetime1">
               <a:rPr lang="en-US" smtClean="0"/>
-              <a:t>12/12/2024</a:t>
+              <a:t>1/2/2025</a:t>
             </a:fld>
             <a:endParaRPr lang="en-US" dirty="0"/>
           </a:p>
@@ -1686,7 +1681,7 @@
           <a:p>
             <a:fld id="{7BFFD690-9426-415D-8B65-26881E07B2D4}" type="datetime1">
               <a:rPr lang="en-US" smtClean="0"/>
-              <a:t>12/12/2024</a:t>
+              <a:t>1/2/2025</a:t>
             </a:fld>
             <a:endParaRPr lang="en-US" dirty="0"/>
           </a:p>
@@ -2108,7 +2103,7 @@
           <a:p>
             <a:fld id="{04C4989A-474C-40DE-95B9-011C28B71673}" type="datetime1">
               <a:rPr lang="en-US" smtClean="0"/>
-              <a:t>12/12/2024</a:t>
+              <a:t>1/2/2025</a:t>
             </a:fld>
             <a:endParaRPr lang="en-US" dirty="0"/>
           </a:p>
@@ -2231,7 +2226,7 @@
           <a:p>
             <a:fld id="{5DB4ED54-5B5E-4A04-93D3-5772E3CE3818}" type="datetime1">
               <a:rPr lang="en-US" smtClean="0"/>
-              <a:t>12/12/2024</a:t>
+              <a:t>1/2/2025</a:t>
             </a:fld>
             <a:endParaRPr lang="en-US" dirty="0"/>
           </a:p>
@@ -2326,7 +2321,7 @@
           <a:p>
             <a:fld id="{4EDE50D6-574B-40AF-946F-D52A04ADE379}" type="datetime1">
               <a:rPr lang="en-US" smtClean="0"/>
-              <a:t>12/12/2024</a:t>
+              <a:t>1/2/2025</a:t>
             </a:fld>
             <a:endParaRPr lang="en-US" dirty="0"/>
           </a:p>
@@ -2703,7 +2698,7 @@
           <a:p>
             <a:fld id="{D82884F1-FFEA-405F-9602-3DCA865EDA4E}" type="datetime1">
               <a:rPr lang="en-US" smtClean="0"/>
-              <a:t>12/12/2024</a:t>
+              <a:t>1/2/2025</a:t>
             </a:fld>
             <a:endParaRPr lang="en-US" dirty="0"/>
           </a:p>
@@ -2996,7 +2991,7 @@
           <a:p>
             <a:fld id="{7E18DB4A-8810-4A10-AD5C-D5E2C667F5B3}" type="datetime1">
               <a:rPr lang="en-US" smtClean="0"/>
-              <a:t>12/12/2024</a:t>
+              <a:t>1/2/2025</a:t>
             </a:fld>
             <a:endParaRPr lang="en-US" dirty="0"/>
           </a:p>
@@ -3211,7 +3206,7 @@
           <a:p>
             <a:fld id="{ED291B17-9318-49DB-B28B-6E5994AE9581}" type="datetime1">
               <a:rPr lang="en-US" smtClean="0"/>
-              <a:t>12/12/2024</a:t>
+              <a:t>1/2/2025</a:t>
             </a:fld>
             <a:endParaRPr lang="en-US" dirty="0"/>
           </a:p>
@@ -4132,62 +4127,91 @@
         <p:spPr>
           <a:xfrm>
             <a:off x="837126" y="3979333"/>
-            <a:ext cx="4320228" cy="1459442"/>
+            <a:ext cx="4320228" cy="2277470"/>
           </a:xfrm>
         </p:spPr>
         <p:txBody>
           <a:bodyPr>
-            <a:normAutofit/>
+            <a:noAutofit/>
           </a:bodyPr>
           <a:lstStyle/>
           <a:p>
             <a:r>
-              <a:rPr lang="en-US" sz="1800" dirty="0">
+              <a:rPr lang="en-US" sz="2800" dirty="0">
                 <a:solidFill>
                   <a:srgbClr val="FFFFFF">
                     <a:alpha val="75000"/>
                   </a:srgbClr>
                 </a:solidFill>
+                <a:latin typeface="Calibri" panose="020F0502020204030204" pitchFamily="34" charset="0"/>
+                <a:ea typeface="Calibri" panose="020F0502020204030204" pitchFamily="34" charset="0"/>
+                <a:cs typeface="Calibri" panose="020F0502020204030204" pitchFamily="34" charset="0"/>
               </a:rPr>
-              <a:t>Yanan </a:t>
-            </a:r>
-            <a:r>
-              <a:rPr lang="en-US" sz="1800" dirty="0" err="1">
+              <a:t>Instructor: Yanan Wu</a:t>
+            </a:r>
+          </a:p>
+          <a:p>
+            <a:r>
+              <a:rPr lang="en-US" sz="2800" dirty="0">
                 <a:solidFill>
                   <a:srgbClr val="FFFFFF">
                     <a:alpha val="75000"/>
                   </a:srgbClr>
                 </a:solidFill>
+                <a:latin typeface="Calibri" panose="020F0502020204030204" pitchFamily="34" charset="0"/>
+                <a:ea typeface="Calibri" panose="020F0502020204030204" pitchFamily="34" charset="0"/>
+                <a:cs typeface="Calibri" panose="020F0502020204030204" pitchFamily="34" charset="0"/>
               </a:rPr>
-              <a:t>wu</a:t>
-            </a:r>
-            <a:endParaRPr lang="en-US" sz="1800" dirty="0">
+              <a:t>TA: Nisar Khadija</a:t>
+            </a:r>
+          </a:p>
+          <a:p>
+            <a:r>
+              <a:rPr lang="en-US" sz="2800" dirty="0">
+                <a:solidFill>
+                  <a:srgbClr val="FFFFFF">
+                    <a:alpha val="75000"/>
+                  </a:srgbClr>
+                </a:solidFill>
+                <a:latin typeface="Calibri" panose="020F0502020204030204" pitchFamily="34" charset="0"/>
+                <a:ea typeface="Calibri" panose="020F0502020204030204" pitchFamily="34" charset="0"/>
+                <a:cs typeface="Calibri" panose="020F0502020204030204" pitchFamily="34" charset="0"/>
+              </a:rPr>
+              <a:t> </a:t>
+            </a:r>
+          </a:p>
+          <a:p>
+            <a:r>
+              <a:rPr lang="en-US" sz="2800" dirty="0">
+                <a:solidFill>
+                  <a:srgbClr val="FFFFFF">
+                    <a:alpha val="75000"/>
+                  </a:srgbClr>
+                </a:solidFill>
+                <a:latin typeface="Calibri" panose="020F0502020204030204" pitchFamily="34" charset="0"/>
+                <a:ea typeface="Calibri" panose="020F0502020204030204" pitchFamily="34" charset="0"/>
+                <a:cs typeface="Calibri" panose="020F0502020204030204" pitchFamily="34" charset="0"/>
+              </a:rPr>
+              <a:t>Spring 2025</a:t>
+            </a:r>
+          </a:p>
+          <a:p>
+            <a:endParaRPr lang="en-US" sz="2800" dirty="0">
               <a:solidFill>
                 <a:srgbClr val="FFFFFF">
                   <a:alpha val="75000"/>
                 </a:srgbClr>
               </a:solidFill>
+              <a:latin typeface="Calibri" panose="020F0502020204030204" pitchFamily="34" charset="0"/>
+              <a:ea typeface="Calibri" panose="020F0502020204030204" pitchFamily="34" charset="0"/>
+              <a:cs typeface="Calibri" panose="020F0502020204030204" pitchFamily="34" charset="0"/>
             </a:endParaRPr>
           </a:p>
           <a:p>
-            <a:r>
-              <a:rPr lang="en-US" sz="1800" dirty="0">
-                <a:solidFill>
-                  <a:srgbClr val="FFFFFF">
-                    <a:alpha val="75000"/>
-                  </a:srgbClr>
-                </a:solidFill>
-              </a:rPr>
-              <a:t>Spring 2025</a:t>
-            </a:r>
-          </a:p>
-          <a:p>
-            <a:endParaRPr lang="en-US" sz="1800" dirty="0">
-              <a:solidFill>
-                <a:srgbClr val="FFFFFF">
-                  <a:alpha val="75000"/>
-                </a:srgbClr>
-              </a:solidFill>
+            <a:endParaRPr lang="en-US" sz="2800" dirty="0">
+              <a:latin typeface="Calibri" panose="020F0502020204030204" pitchFamily="34" charset="0"/>
+              <a:ea typeface="Calibri" panose="020F0502020204030204" pitchFamily="34" charset="0"/>
+              <a:cs typeface="Calibri" panose="020F0502020204030204" pitchFamily="34" charset="0"/>
             </a:endParaRPr>
           </a:p>
         </p:txBody>
@@ -4227,7 +4251,7 @@
           <p:cNvPr id="2" name="Title 1">
             <a:extLst>
               <a:ext uri="{FF2B5EF4-FFF2-40B4-BE49-F238E27FC236}">
-                <a16:creationId xmlns:a16="http://schemas.microsoft.com/office/drawing/2014/main" id="{F60D52E1-A985-F05E-3DB3-FA1F8CD9DF52}"/>
+                <a16:creationId xmlns:a16="http://schemas.microsoft.com/office/drawing/2014/main" id="{D3288A91-2B12-48EA-0F3D-463392701478}"/>
               </a:ext>
             </a:extLst>
           </p:cNvPr>
@@ -4238,20 +4262,12 @@
             <p:ph type="title"/>
           </p:nvPr>
         </p:nvSpPr>
-        <p:spPr>
-          <a:xfrm>
-            <a:off x="581192" y="702156"/>
-            <a:ext cx="11029616" cy="597255"/>
-          </a:xfrm>
-        </p:spPr>
+        <p:spPr/>
         <p:txBody>
           <a:bodyPr/>
           <a:lstStyle/>
           <a:p>
-            <a:r>
-              <a:rPr lang="en-US" dirty="0"/>
-              <a:t>Preamble</a:t>
-            </a:r>
+            <a:endParaRPr lang="en-US"/>
           </a:p>
         </p:txBody>
       </p:sp>
@@ -4260,7 +4276,7 @@
           <p:cNvPr id="3" name="Content Placeholder 2">
             <a:extLst>
               <a:ext uri="{FF2B5EF4-FFF2-40B4-BE49-F238E27FC236}">
-                <a16:creationId xmlns:a16="http://schemas.microsoft.com/office/drawing/2014/main" id="{967BC616-FD20-0CC3-4E9B-925D39405D29}"/>
+                <a16:creationId xmlns:a16="http://schemas.microsoft.com/office/drawing/2014/main" id="{B2522736-1C8F-D258-ECC8-5331837B4268}"/>
               </a:ext>
             </a:extLst>
           </p:cNvPr>
@@ -4271,63 +4287,19 @@
             <p:ph idx="1"/>
           </p:nvPr>
         </p:nvSpPr>
-        <p:spPr>
-          <a:xfrm>
-            <a:off x="581192" y="1604211"/>
-            <a:ext cx="11029615" cy="4371139"/>
-          </a:xfrm>
-        </p:spPr>
+        <p:spPr/>
         <p:txBody>
           <a:bodyPr/>
           <a:lstStyle/>
           <a:p>
-            <a:r>
-              <a:rPr lang="en-US" dirty="0"/>
-              <a:t>A good online textbook, </a:t>
-            </a:r>
-            <a:r>
-              <a:rPr lang="en-US" dirty="0">
-                <a:hlinkClick r:id="rId2"/>
-              </a:rPr>
-              <a:t>Hands-on Programming with R</a:t>
-            </a:r>
-            <a:r>
-              <a:rPr lang="en-US" dirty="0"/>
-              <a:t>, for R beginner. </a:t>
-            </a:r>
-          </a:p>
-          <a:p>
-            <a:r>
-              <a:rPr lang="en-US" dirty="0"/>
-              <a:t>Explore the R project website: </a:t>
-            </a:r>
-            <a:r>
-              <a:rPr lang="en-US" dirty="0">
-                <a:hlinkClick r:id="rId3"/>
-              </a:rPr>
-              <a:t>https://www.r-project.org/</a:t>
-            </a:r>
-            <a:endParaRPr lang="en-US" dirty="0"/>
-          </a:p>
-          <a:p>
-            <a:r>
-              <a:rPr lang="en-US" dirty="0"/>
-              <a:t>Explore R Studio: </a:t>
-            </a:r>
-            <a:r>
-              <a:rPr lang="en-US" dirty="0">
-                <a:hlinkClick r:id="rId4"/>
-              </a:rPr>
-              <a:t>https://posit.co/</a:t>
-            </a:r>
-            <a:endParaRPr lang="en-US" dirty="0"/>
+            <a:endParaRPr lang="en-US"/>
           </a:p>
         </p:txBody>
       </p:sp>
     </p:spTree>
     <p:extLst>
       <p:ext uri="{BB962C8B-B14F-4D97-AF65-F5344CB8AC3E}">
-        <p14:creationId xmlns:p14="http://schemas.microsoft.com/office/powerpoint/2010/main" val="1235554213"/>
+        <p14:creationId xmlns:p14="http://schemas.microsoft.com/office/powerpoint/2010/main" val="2216533061"/>
       </p:ext>
     </p:extLst>
   </p:cSld>
@@ -4359,1766 +4331,6 @@
           <p:cNvPr id="2" name="Title 1">
             <a:extLst>
               <a:ext uri="{FF2B5EF4-FFF2-40B4-BE49-F238E27FC236}">
-                <a16:creationId xmlns:a16="http://schemas.microsoft.com/office/drawing/2014/main" id="{00AB2D42-357C-B1A6-9BD8-35AA7EF9E907}"/>
-              </a:ext>
-            </a:extLst>
-          </p:cNvPr>
-          <p:cNvSpPr>
-            <a:spLocks noGrp="1"/>
-          </p:cNvSpPr>
-          <p:nvPr>
-            <p:ph type="title"/>
-          </p:nvPr>
-        </p:nvSpPr>
-        <p:spPr>
-          <a:xfrm>
-            <a:off x="581192" y="702156"/>
-            <a:ext cx="11029616" cy="567844"/>
-          </a:xfrm>
-        </p:spPr>
-        <p:txBody>
-          <a:bodyPr/>
-          <a:lstStyle/>
-          <a:p>
-            <a:r>
-              <a:rPr lang="en-US" dirty="0"/>
-              <a:t>R-INTRODUCTION</a:t>
-            </a:r>
-          </a:p>
-        </p:txBody>
-      </p:sp>
-      <p:sp>
-        <p:nvSpPr>
-          <p:cNvPr id="3" name="Content Placeholder 2">
-            <a:extLst>
-              <a:ext uri="{FF2B5EF4-FFF2-40B4-BE49-F238E27FC236}">
-                <a16:creationId xmlns:a16="http://schemas.microsoft.com/office/drawing/2014/main" id="{BA0DE883-575A-D8AA-9F01-D0BDB9E3A534}"/>
-              </a:ext>
-            </a:extLst>
-          </p:cNvPr>
-          <p:cNvSpPr>
-            <a:spLocks noGrp="1"/>
-          </p:cNvSpPr>
-          <p:nvPr>
-            <p:ph idx="1"/>
-          </p:nvPr>
-        </p:nvSpPr>
-        <p:spPr>
-          <a:xfrm>
-            <a:off x="581191" y="1350264"/>
-            <a:ext cx="11029615" cy="567844"/>
-          </a:xfrm>
-        </p:spPr>
-        <p:txBody>
-          <a:bodyPr/>
-          <a:lstStyle/>
-          <a:p>
-            <a:r>
-              <a:rPr lang="en-US" dirty="0"/>
-              <a:t>An online free learning source:  </a:t>
-            </a:r>
-            <a:r>
-              <a:rPr lang="en-US" dirty="0">
-                <a:hlinkClick r:id="rId2"/>
-              </a:rPr>
-              <a:t>An Introduction to R</a:t>
-            </a:r>
-            <a:endParaRPr lang="en-US" dirty="0"/>
-          </a:p>
-        </p:txBody>
-      </p:sp>
-      <p:sp>
-        <p:nvSpPr>
-          <p:cNvPr id="5" name="TextBox 4">
-            <a:extLst>
-              <a:ext uri="{FF2B5EF4-FFF2-40B4-BE49-F238E27FC236}">
-                <a16:creationId xmlns:a16="http://schemas.microsoft.com/office/drawing/2014/main" id="{29A0EA8D-5246-A32D-4815-EF7401CB2BD3}"/>
-              </a:ext>
-            </a:extLst>
-          </p:cNvPr>
-          <p:cNvSpPr txBox="1"/>
-          <p:nvPr/>
-        </p:nvSpPr>
-        <p:spPr>
-          <a:xfrm>
-            <a:off x="2218268" y="1998372"/>
-            <a:ext cx="2438400" cy="369332"/>
-          </a:xfrm>
-          <a:prstGeom prst="rect">
-            <a:avLst/>
-          </a:prstGeom>
-          <a:noFill/>
-        </p:spPr>
-        <p:txBody>
-          <a:bodyPr wrap="square" rtlCol="0">
-            <a:spAutoFit/>
-          </a:bodyPr>
-          <a:lstStyle/>
-          <a:p>
-            <a:r>
-              <a:rPr lang="en-US" dirty="0"/>
-              <a:t>Data Manipulation</a:t>
-            </a:r>
-          </a:p>
-        </p:txBody>
-      </p:sp>
-      <p:pic>
-        <p:nvPicPr>
-          <p:cNvPr id="12" name="Picture 11">
-            <a:extLst>
-              <a:ext uri="{FF2B5EF4-FFF2-40B4-BE49-F238E27FC236}">
-                <a16:creationId xmlns:a16="http://schemas.microsoft.com/office/drawing/2014/main" id="{A2ABC7AB-8C96-D4B3-A1D2-E0BB80F5D4F8}"/>
-              </a:ext>
-            </a:extLst>
-          </p:cNvPr>
-          <p:cNvPicPr>
-            <a:picLocks noChangeAspect="1"/>
-          </p:cNvPicPr>
-          <p:nvPr/>
-        </p:nvPicPr>
-        <p:blipFill>
-          <a:blip r:embed="rId3"/>
-          <a:stretch>
-            <a:fillRect/>
-          </a:stretch>
-        </p:blipFill>
-        <p:spPr>
-          <a:xfrm>
-            <a:off x="1162311" y="2568450"/>
-            <a:ext cx="3739889" cy="4130286"/>
-          </a:xfrm>
-          <a:prstGeom prst="rect">
-            <a:avLst/>
-          </a:prstGeom>
-        </p:spPr>
-      </p:pic>
-      <p:sp>
-        <p:nvSpPr>
-          <p:cNvPr id="13" name="TextBox 12">
-            <a:extLst>
-              <a:ext uri="{FF2B5EF4-FFF2-40B4-BE49-F238E27FC236}">
-                <a16:creationId xmlns:a16="http://schemas.microsoft.com/office/drawing/2014/main" id="{34D704B2-E657-F7E3-85CE-A7D7388ADC90}"/>
-              </a:ext>
-            </a:extLst>
-          </p:cNvPr>
-          <p:cNvSpPr txBox="1"/>
-          <p:nvPr/>
-        </p:nvSpPr>
-        <p:spPr>
-          <a:xfrm>
-            <a:off x="8229601" y="3984987"/>
-            <a:ext cx="2438400" cy="369332"/>
-          </a:xfrm>
-          <a:prstGeom prst="rect">
-            <a:avLst/>
-          </a:prstGeom>
-          <a:noFill/>
-        </p:spPr>
-        <p:txBody>
-          <a:bodyPr wrap="square" rtlCol="0">
-            <a:spAutoFit/>
-          </a:bodyPr>
-          <a:lstStyle/>
-          <a:p>
-            <a:r>
-              <a:rPr lang="en-US" dirty="0"/>
-              <a:t>Interactive Applications</a:t>
-            </a:r>
-          </a:p>
-        </p:txBody>
-      </p:sp>
-      <p:sp>
-        <p:nvSpPr>
-          <p:cNvPr id="14" name="TextBox 13">
-            <a:extLst>
-              <a:ext uri="{FF2B5EF4-FFF2-40B4-BE49-F238E27FC236}">
-                <a16:creationId xmlns:a16="http://schemas.microsoft.com/office/drawing/2014/main" id="{44726345-900F-C015-C861-8F342B6E1EC9}"/>
-              </a:ext>
-            </a:extLst>
-          </p:cNvPr>
-          <p:cNvSpPr txBox="1"/>
-          <p:nvPr/>
-        </p:nvSpPr>
-        <p:spPr>
-          <a:xfrm>
-            <a:off x="6629400" y="2098077"/>
-            <a:ext cx="5207001" cy="1533762"/>
-          </a:xfrm>
-          <a:prstGeom prst="rect">
-            <a:avLst/>
-          </a:prstGeom>
-        </p:spPr>
-        <p:txBody>
-          <a:bodyPr vert="horz" lIns="91440" tIns="45720" rIns="91440" bIns="45720" rtlCol="0" anchor="ctr">
-            <a:normAutofit lnSpcReduction="10000"/>
-          </a:bodyPr>
-          <a:lstStyle>
-            <a:lvl1pPr marL="306000" indent="-306000">
-              <a:lnSpc>
-                <a:spcPct val="100000"/>
-              </a:lnSpc>
-              <a:spcBef>
-                <a:spcPct val="20000"/>
-              </a:spcBef>
-              <a:spcAft>
-                <a:spcPts val="600"/>
-              </a:spcAft>
-              <a:buClr>
-                <a:schemeClr val="accent1"/>
-              </a:buClr>
-              <a:buSzPct val="92000"/>
-              <a:buFont typeface="Wingdings 2" panose="05020102010507070707" pitchFamily="18" charset="2"/>
-              <a:buChar char=""/>
-              <a:defRPr>
-                <a:solidFill>
-                  <a:schemeClr val="tx1">
-                    <a:lumMod val="75000"/>
-                    <a:lumOff val="25000"/>
-                  </a:schemeClr>
-                </a:solidFill>
-              </a:defRPr>
-            </a:lvl1pPr>
-            <a:lvl2pPr marL="630000" indent="-306000">
-              <a:lnSpc>
-                <a:spcPct val="100000"/>
-              </a:lnSpc>
-              <a:spcBef>
-                <a:spcPct val="20000"/>
-              </a:spcBef>
-              <a:spcAft>
-                <a:spcPts val="600"/>
-              </a:spcAft>
-              <a:buClr>
-                <a:schemeClr val="accent1"/>
-              </a:buClr>
-              <a:buSzPct val="92000"/>
-              <a:buFont typeface="Wingdings 2" panose="05020102010507070707" pitchFamily="18" charset="2"/>
-              <a:buChar char=""/>
-              <a:defRPr sz="1600">
-                <a:solidFill>
-                  <a:schemeClr val="tx1">
-                    <a:lumMod val="75000"/>
-                    <a:lumOff val="25000"/>
-                  </a:schemeClr>
-                </a:solidFill>
-              </a:defRPr>
-            </a:lvl2pPr>
-            <a:lvl3pPr marL="900000" indent="-270000">
-              <a:lnSpc>
-                <a:spcPct val="100000"/>
-              </a:lnSpc>
-              <a:spcBef>
-                <a:spcPct val="20000"/>
-              </a:spcBef>
-              <a:spcAft>
-                <a:spcPts val="600"/>
-              </a:spcAft>
-              <a:buClr>
-                <a:schemeClr val="accent1"/>
-              </a:buClr>
-              <a:buSzPct val="92000"/>
-              <a:buFont typeface="Wingdings 2" panose="05020102010507070707" pitchFamily="18" charset="2"/>
-              <a:buChar char=""/>
-              <a:defRPr sz="1400">
-                <a:solidFill>
-                  <a:schemeClr val="tx1">
-                    <a:lumMod val="75000"/>
-                    <a:lumOff val="25000"/>
-                  </a:schemeClr>
-                </a:solidFill>
-              </a:defRPr>
-            </a:lvl3pPr>
-            <a:lvl4pPr marL="1242000" indent="-234000">
-              <a:lnSpc>
-                <a:spcPct val="100000"/>
-              </a:lnSpc>
-              <a:spcBef>
-                <a:spcPct val="20000"/>
-              </a:spcBef>
-              <a:spcAft>
-                <a:spcPts val="600"/>
-              </a:spcAft>
-              <a:buClr>
-                <a:schemeClr val="accent1"/>
-              </a:buClr>
-              <a:buSzPct val="92000"/>
-              <a:buFont typeface="Wingdings 2" panose="05020102010507070707" pitchFamily="18" charset="2"/>
-              <a:buChar char=""/>
-              <a:defRPr sz="1200">
-                <a:solidFill>
-                  <a:schemeClr val="tx1">
-                    <a:lumMod val="75000"/>
-                    <a:lumOff val="25000"/>
-                  </a:schemeClr>
-                </a:solidFill>
-              </a:defRPr>
-            </a:lvl4pPr>
-            <a:lvl5pPr marL="1602000" indent="-234000">
-              <a:lnSpc>
-                <a:spcPct val="100000"/>
-              </a:lnSpc>
-              <a:spcBef>
-                <a:spcPct val="20000"/>
-              </a:spcBef>
-              <a:spcAft>
-                <a:spcPts val="600"/>
-              </a:spcAft>
-              <a:buClr>
-                <a:schemeClr val="accent1"/>
-              </a:buClr>
-              <a:buSzPct val="92000"/>
-              <a:buFont typeface="Wingdings 2" panose="05020102010507070707" pitchFamily="18" charset="2"/>
-              <a:buChar char=""/>
-              <a:defRPr sz="1200">
-                <a:solidFill>
-                  <a:schemeClr val="tx1">
-                    <a:lumMod val="75000"/>
-                    <a:lumOff val="25000"/>
-                  </a:schemeClr>
-                </a:solidFill>
-              </a:defRPr>
-            </a:lvl5pPr>
-            <a:lvl6pPr marL="1900000" indent="-228600">
-              <a:spcBef>
-                <a:spcPct val="20000"/>
-              </a:spcBef>
-              <a:spcAft>
-                <a:spcPts val="600"/>
-              </a:spcAft>
-              <a:buClr>
-                <a:schemeClr val="accent2"/>
-              </a:buClr>
-              <a:buSzPct val="92000"/>
-              <a:buFont typeface="Wingdings 2" panose="05020102010507070707" pitchFamily="18" charset="2"/>
-              <a:buChar char=""/>
-              <a:defRPr sz="1200">
-                <a:solidFill>
-                  <a:schemeClr val="tx2"/>
-                </a:solidFill>
-              </a:defRPr>
-            </a:lvl6pPr>
-            <a:lvl7pPr marL="2200000" indent="-228600">
-              <a:spcBef>
-                <a:spcPct val="20000"/>
-              </a:spcBef>
-              <a:spcAft>
-                <a:spcPts val="600"/>
-              </a:spcAft>
-              <a:buClr>
-                <a:schemeClr val="accent2"/>
-              </a:buClr>
-              <a:buSzPct val="92000"/>
-              <a:buFont typeface="Wingdings 2" panose="05020102010507070707" pitchFamily="18" charset="2"/>
-              <a:buChar char=""/>
-              <a:defRPr sz="1200">
-                <a:solidFill>
-                  <a:schemeClr val="tx2"/>
-                </a:solidFill>
-              </a:defRPr>
-            </a:lvl7pPr>
-            <a:lvl8pPr marL="2500000" indent="-228600">
-              <a:spcBef>
-                <a:spcPct val="20000"/>
-              </a:spcBef>
-              <a:spcAft>
-                <a:spcPts val="600"/>
-              </a:spcAft>
-              <a:buClr>
-                <a:schemeClr val="accent2"/>
-              </a:buClr>
-              <a:buSzPct val="92000"/>
-              <a:buFont typeface="Wingdings 2" panose="05020102010507070707" pitchFamily="18" charset="2"/>
-              <a:buChar char=""/>
-              <a:defRPr sz="1200">
-                <a:solidFill>
-                  <a:schemeClr val="tx2"/>
-                </a:solidFill>
-              </a:defRPr>
-            </a:lvl8pPr>
-            <a:lvl9pPr marL="2800000" indent="-228600">
-              <a:spcBef>
-                <a:spcPct val="20000"/>
-              </a:spcBef>
-              <a:spcAft>
-                <a:spcPts val="600"/>
-              </a:spcAft>
-              <a:buClr>
-                <a:schemeClr val="accent2"/>
-              </a:buClr>
-              <a:buSzPct val="92000"/>
-              <a:buFont typeface="Wingdings 2" panose="05020102010507070707" pitchFamily="18" charset="2"/>
-              <a:buChar char=""/>
-              <a:defRPr sz="1200">
-                <a:solidFill>
-                  <a:schemeClr val="tx2"/>
-                </a:solidFill>
-              </a:defRPr>
-            </a:lvl9pPr>
-          </a:lstStyle>
-          <a:p>
-            <a:pPr marL="0" indent="0" algn="ctr">
-              <a:buNone/>
-            </a:pPr>
-            <a:r>
-              <a:rPr lang="en-US" dirty="0"/>
-              <a:t>Data Visualization</a:t>
-            </a:r>
-          </a:p>
-          <a:p>
-            <a:endParaRPr lang="en-US" dirty="0"/>
-          </a:p>
-          <a:p>
-            <a:r>
-              <a:rPr lang="en-US" dirty="0"/>
-              <a:t>Data Visualization Section in </a:t>
-            </a:r>
-            <a:r>
-              <a:rPr lang="en-US" dirty="0">
-                <a:hlinkClick r:id="rId4"/>
-              </a:rPr>
-              <a:t>R for Data Science</a:t>
-            </a:r>
-            <a:endParaRPr lang="en-US" dirty="0"/>
-          </a:p>
-          <a:p>
-            <a:r>
-              <a:rPr lang="en-US" dirty="0">
-                <a:hlinkClick r:id="rId5"/>
-              </a:rPr>
-              <a:t>Modern Data Visualization with R</a:t>
-            </a:r>
-            <a:endParaRPr lang="en-US" dirty="0"/>
-          </a:p>
-        </p:txBody>
-      </p:sp>
-      <p:sp>
-        <p:nvSpPr>
-          <p:cNvPr id="15" name="TextBox 14">
-            <a:extLst>
-              <a:ext uri="{FF2B5EF4-FFF2-40B4-BE49-F238E27FC236}">
-                <a16:creationId xmlns:a16="http://schemas.microsoft.com/office/drawing/2014/main" id="{A9B4895F-93C4-229F-839F-F40E65141117}"/>
-              </a:ext>
-            </a:extLst>
-          </p:cNvPr>
-          <p:cNvSpPr txBox="1"/>
-          <p:nvPr/>
-        </p:nvSpPr>
-        <p:spPr>
-          <a:xfrm>
-            <a:off x="6739467" y="4707467"/>
-            <a:ext cx="4047065" cy="1448377"/>
-          </a:xfrm>
-          <a:prstGeom prst="rect">
-            <a:avLst/>
-          </a:prstGeom>
-        </p:spPr>
-        <p:txBody>
-          <a:bodyPr vert="horz" lIns="91440" tIns="45720" rIns="91440" bIns="45720" rtlCol="0" anchor="ctr">
-            <a:normAutofit/>
-          </a:bodyPr>
-          <a:lstStyle>
-            <a:defPPr>
-              <a:defRPr lang="en-US"/>
-            </a:defPPr>
-            <a:lvl1pPr indent="0" algn="ctr">
-              <a:lnSpc>
-                <a:spcPct val="100000"/>
-              </a:lnSpc>
-              <a:spcBef>
-                <a:spcPct val="20000"/>
-              </a:spcBef>
-              <a:spcAft>
-                <a:spcPts val="600"/>
-              </a:spcAft>
-              <a:buClr>
-                <a:schemeClr val="accent1"/>
-              </a:buClr>
-              <a:buSzPct val="92000"/>
-              <a:buFont typeface="Wingdings 2" panose="05020102010507070707" pitchFamily="18" charset="2"/>
-              <a:buNone/>
-              <a:defRPr>
-                <a:solidFill>
-                  <a:schemeClr val="tx1">
-                    <a:lumMod val="75000"/>
-                    <a:lumOff val="25000"/>
-                  </a:schemeClr>
-                </a:solidFill>
-              </a:defRPr>
-            </a:lvl1pPr>
-            <a:lvl2pPr marL="630000" indent="-306000">
-              <a:lnSpc>
-                <a:spcPct val="100000"/>
-              </a:lnSpc>
-              <a:spcBef>
-                <a:spcPct val="20000"/>
-              </a:spcBef>
-              <a:spcAft>
-                <a:spcPts val="600"/>
-              </a:spcAft>
-              <a:buClr>
-                <a:schemeClr val="accent1"/>
-              </a:buClr>
-              <a:buSzPct val="92000"/>
-              <a:buFont typeface="Wingdings 2" panose="05020102010507070707" pitchFamily="18" charset="2"/>
-              <a:buChar char=""/>
-              <a:defRPr sz="1600">
-                <a:solidFill>
-                  <a:schemeClr val="tx1">
-                    <a:lumMod val="75000"/>
-                    <a:lumOff val="25000"/>
-                  </a:schemeClr>
-                </a:solidFill>
-              </a:defRPr>
-            </a:lvl2pPr>
-            <a:lvl3pPr marL="900000" indent="-270000">
-              <a:lnSpc>
-                <a:spcPct val="100000"/>
-              </a:lnSpc>
-              <a:spcBef>
-                <a:spcPct val="20000"/>
-              </a:spcBef>
-              <a:spcAft>
-                <a:spcPts val="600"/>
-              </a:spcAft>
-              <a:buClr>
-                <a:schemeClr val="accent1"/>
-              </a:buClr>
-              <a:buSzPct val="92000"/>
-              <a:buFont typeface="Wingdings 2" panose="05020102010507070707" pitchFamily="18" charset="2"/>
-              <a:buChar char=""/>
-              <a:defRPr sz="1400">
-                <a:solidFill>
-                  <a:schemeClr val="tx1">
-                    <a:lumMod val="75000"/>
-                    <a:lumOff val="25000"/>
-                  </a:schemeClr>
-                </a:solidFill>
-              </a:defRPr>
-            </a:lvl3pPr>
-            <a:lvl4pPr marL="1242000" indent="-234000">
-              <a:lnSpc>
-                <a:spcPct val="100000"/>
-              </a:lnSpc>
-              <a:spcBef>
-                <a:spcPct val="20000"/>
-              </a:spcBef>
-              <a:spcAft>
-                <a:spcPts val="600"/>
-              </a:spcAft>
-              <a:buClr>
-                <a:schemeClr val="accent1"/>
-              </a:buClr>
-              <a:buSzPct val="92000"/>
-              <a:buFont typeface="Wingdings 2" panose="05020102010507070707" pitchFamily="18" charset="2"/>
-              <a:buChar char=""/>
-              <a:defRPr sz="1200">
-                <a:solidFill>
-                  <a:schemeClr val="tx1">
-                    <a:lumMod val="75000"/>
-                    <a:lumOff val="25000"/>
-                  </a:schemeClr>
-                </a:solidFill>
-              </a:defRPr>
-            </a:lvl4pPr>
-            <a:lvl5pPr marL="1602000" indent="-234000">
-              <a:lnSpc>
-                <a:spcPct val="100000"/>
-              </a:lnSpc>
-              <a:spcBef>
-                <a:spcPct val="20000"/>
-              </a:spcBef>
-              <a:spcAft>
-                <a:spcPts val="600"/>
-              </a:spcAft>
-              <a:buClr>
-                <a:schemeClr val="accent1"/>
-              </a:buClr>
-              <a:buSzPct val="92000"/>
-              <a:buFont typeface="Wingdings 2" panose="05020102010507070707" pitchFamily="18" charset="2"/>
-              <a:buChar char=""/>
-              <a:defRPr sz="1200">
-                <a:solidFill>
-                  <a:schemeClr val="tx1">
-                    <a:lumMod val="75000"/>
-                    <a:lumOff val="25000"/>
-                  </a:schemeClr>
-                </a:solidFill>
-              </a:defRPr>
-            </a:lvl5pPr>
-            <a:lvl6pPr marL="1900000" indent="-228600">
-              <a:spcBef>
-                <a:spcPct val="20000"/>
-              </a:spcBef>
-              <a:spcAft>
-                <a:spcPts val="600"/>
-              </a:spcAft>
-              <a:buClr>
-                <a:schemeClr val="accent2"/>
-              </a:buClr>
-              <a:buSzPct val="92000"/>
-              <a:buFont typeface="Wingdings 2" panose="05020102010507070707" pitchFamily="18" charset="2"/>
-              <a:buChar char=""/>
-              <a:defRPr sz="1200">
-                <a:solidFill>
-                  <a:schemeClr val="tx2"/>
-                </a:solidFill>
-              </a:defRPr>
-            </a:lvl6pPr>
-            <a:lvl7pPr marL="2200000" indent="-228600">
-              <a:spcBef>
-                <a:spcPct val="20000"/>
-              </a:spcBef>
-              <a:spcAft>
-                <a:spcPts val="600"/>
-              </a:spcAft>
-              <a:buClr>
-                <a:schemeClr val="accent2"/>
-              </a:buClr>
-              <a:buSzPct val="92000"/>
-              <a:buFont typeface="Wingdings 2" panose="05020102010507070707" pitchFamily="18" charset="2"/>
-              <a:buChar char=""/>
-              <a:defRPr sz="1200">
-                <a:solidFill>
-                  <a:schemeClr val="tx2"/>
-                </a:solidFill>
-              </a:defRPr>
-            </a:lvl7pPr>
-            <a:lvl8pPr marL="2500000" indent="-228600">
-              <a:spcBef>
-                <a:spcPct val="20000"/>
-              </a:spcBef>
-              <a:spcAft>
-                <a:spcPts val="600"/>
-              </a:spcAft>
-              <a:buClr>
-                <a:schemeClr val="accent2"/>
-              </a:buClr>
-              <a:buSzPct val="92000"/>
-              <a:buFont typeface="Wingdings 2" panose="05020102010507070707" pitchFamily="18" charset="2"/>
-              <a:buChar char=""/>
-              <a:defRPr sz="1200">
-                <a:solidFill>
-                  <a:schemeClr val="tx2"/>
-                </a:solidFill>
-              </a:defRPr>
-            </a:lvl8pPr>
-            <a:lvl9pPr marL="2800000" indent="-228600">
-              <a:spcBef>
-                <a:spcPct val="20000"/>
-              </a:spcBef>
-              <a:spcAft>
-                <a:spcPts val="600"/>
-              </a:spcAft>
-              <a:buClr>
-                <a:schemeClr val="accent2"/>
-              </a:buClr>
-              <a:buSzPct val="92000"/>
-              <a:buFont typeface="Wingdings 2" panose="05020102010507070707" pitchFamily="18" charset="2"/>
-              <a:buChar char=""/>
-              <a:defRPr sz="1200">
-                <a:solidFill>
-                  <a:schemeClr val="tx2"/>
-                </a:solidFill>
-              </a:defRPr>
-            </a:lvl9pPr>
-          </a:lstStyle>
-          <a:p>
-            <a:pPr marL="285750" indent="-285750" algn="l">
-              <a:buFont typeface="Wingdings" panose="05000000000000000000" pitchFamily="2" charset="2"/>
-              <a:buChar char="§"/>
-            </a:pPr>
-            <a:r>
-              <a:rPr lang="en-US" dirty="0">
-                <a:hlinkClick r:id="rId6"/>
-              </a:rPr>
-              <a:t>Shiny Gallery in R</a:t>
-            </a:r>
-            <a:endParaRPr lang="en-US" dirty="0"/>
-          </a:p>
-          <a:p>
-            <a:endParaRPr lang="en-US" dirty="0"/>
-          </a:p>
-        </p:txBody>
-      </p:sp>
-    </p:spTree>
-    <p:extLst>
-      <p:ext uri="{BB962C8B-B14F-4D97-AF65-F5344CB8AC3E}">
-        <p14:creationId xmlns:p14="http://schemas.microsoft.com/office/powerpoint/2010/main" val="389562344"/>
-      </p:ext>
-    </p:extLst>
-  </p:cSld>
-  <p:clrMapOvr>
-    <a:masterClrMapping/>
-  </p:clrMapOvr>
-</p:sld>
-</file>
-
-<file path=ppt/slides/slide4.xml><?xml version="1.0" encoding="utf-8"?>
-<p:sld xmlns:a="http://schemas.openxmlformats.org/drawingml/2006/main" xmlns:r="http://schemas.openxmlformats.org/officeDocument/2006/relationships" xmlns:p="http://schemas.openxmlformats.org/presentationml/2006/main">
-  <p:cSld>
-    <p:spTree>
-      <p:nvGrpSpPr>
-        <p:cNvPr id="1" name=""/>
-        <p:cNvGrpSpPr/>
-        <p:nvPr/>
-      </p:nvGrpSpPr>
-      <p:grpSpPr>
-        <a:xfrm>
-          <a:off x="0" y="0"/>
-          <a:ext cx="0" cy="0"/>
-          <a:chOff x="0" y="0"/>
-          <a:chExt cx="0" cy="0"/>
-        </a:xfrm>
-      </p:grpSpPr>
-      <p:sp>
-        <p:nvSpPr>
-          <p:cNvPr id="6" name="Title 5">
-            <a:extLst>
-              <a:ext uri="{FF2B5EF4-FFF2-40B4-BE49-F238E27FC236}">
-                <a16:creationId xmlns:a16="http://schemas.microsoft.com/office/drawing/2014/main" id="{2ABC362E-1B18-9966-A9CB-F82CFEA7ABA2}"/>
-              </a:ext>
-            </a:extLst>
-          </p:cNvPr>
-          <p:cNvSpPr>
-            <a:spLocks noGrp="1"/>
-          </p:cNvSpPr>
-          <p:nvPr>
-            <p:ph type="title"/>
-          </p:nvPr>
-        </p:nvSpPr>
-        <p:spPr>
-          <a:xfrm>
-            <a:off x="581192" y="702156"/>
-            <a:ext cx="11029616" cy="646331"/>
-          </a:xfrm>
-        </p:spPr>
-        <p:txBody>
-          <a:bodyPr/>
-          <a:lstStyle/>
-          <a:p>
-            <a:r>
-              <a:rPr lang="en-US" dirty="0"/>
-              <a:t>R - Introduction</a:t>
-            </a:r>
-          </a:p>
-        </p:txBody>
-      </p:sp>
-      <p:sp>
-        <p:nvSpPr>
-          <p:cNvPr id="7" name="TextBox 6">
-            <a:extLst>
-              <a:ext uri="{FF2B5EF4-FFF2-40B4-BE49-F238E27FC236}">
-                <a16:creationId xmlns:a16="http://schemas.microsoft.com/office/drawing/2014/main" id="{785BB354-13AE-5762-F3DF-53CFFD1955AC}"/>
-              </a:ext>
-            </a:extLst>
-          </p:cNvPr>
-          <p:cNvSpPr txBox="1"/>
-          <p:nvPr/>
-        </p:nvSpPr>
-        <p:spPr>
-          <a:xfrm>
-            <a:off x="482602" y="2125132"/>
-            <a:ext cx="5613398" cy="2443747"/>
-          </a:xfrm>
-          <a:prstGeom prst="rect">
-            <a:avLst/>
-          </a:prstGeom>
-        </p:spPr>
-        <p:txBody>
-          <a:bodyPr vert="horz" lIns="91440" tIns="45720" rIns="91440" bIns="45720" rtlCol="0" anchor="ctr">
-            <a:normAutofit/>
-          </a:bodyPr>
-          <a:lstStyle>
-            <a:defPPr>
-              <a:defRPr lang="en-US"/>
-            </a:defPPr>
-            <a:lvl1pPr indent="0" algn="ctr">
-              <a:lnSpc>
-                <a:spcPct val="100000"/>
-              </a:lnSpc>
-              <a:spcBef>
-                <a:spcPct val="20000"/>
-              </a:spcBef>
-              <a:spcAft>
-                <a:spcPts val="600"/>
-              </a:spcAft>
-              <a:buClr>
-                <a:schemeClr val="accent1"/>
-              </a:buClr>
-              <a:buSzPct val="92000"/>
-              <a:buFont typeface="Wingdings 2" panose="05020102010507070707" pitchFamily="18" charset="2"/>
-              <a:buNone/>
-              <a:defRPr>
-                <a:solidFill>
-                  <a:schemeClr val="tx1">
-                    <a:lumMod val="75000"/>
-                    <a:lumOff val="25000"/>
-                  </a:schemeClr>
-                </a:solidFill>
-              </a:defRPr>
-            </a:lvl1pPr>
-            <a:lvl2pPr marL="630000" indent="-306000">
-              <a:lnSpc>
-                <a:spcPct val="100000"/>
-              </a:lnSpc>
-              <a:spcBef>
-                <a:spcPct val="20000"/>
-              </a:spcBef>
-              <a:spcAft>
-                <a:spcPts val="600"/>
-              </a:spcAft>
-              <a:buClr>
-                <a:schemeClr val="accent1"/>
-              </a:buClr>
-              <a:buSzPct val="92000"/>
-              <a:buFont typeface="Wingdings 2" panose="05020102010507070707" pitchFamily="18" charset="2"/>
-              <a:buChar char=""/>
-              <a:defRPr sz="1600">
-                <a:solidFill>
-                  <a:schemeClr val="tx1">
-                    <a:lumMod val="75000"/>
-                    <a:lumOff val="25000"/>
-                  </a:schemeClr>
-                </a:solidFill>
-              </a:defRPr>
-            </a:lvl2pPr>
-            <a:lvl3pPr marL="900000" indent="-270000">
-              <a:lnSpc>
-                <a:spcPct val="100000"/>
-              </a:lnSpc>
-              <a:spcBef>
-                <a:spcPct val="20000"/>
-              </a:spcBef>
-              <a:spcAft>
-                <a:spcPts val="600"/>
-              </a:spcAft>
-              <a:buClr>
-                <a:schemeClr val="accent1"/>
-              </a:buClr>
-              <a:buSzPct val="92000"/>
-              <a:buFont typeface="Wingdings 2" panose="05020102010507070707" pitchFamily="18" charset="2"/>
-              <a:buChar char=""/>
-              <a:defRPr sz="1400">
-                <a:solidFill>
-                  <a:schemeClr val="tx1">
-                    <a:lumMod val="75000"/>
-                    <a:lumOff val="25000"/>
-                  </a:schemeClr>
-                </a:solidFill>
-              </a:defRPr>
-            </a:lvl3pPr>
-            <a:lvl4pPr marL="1242000" indent="-234000">
-              <a:lnSpc>
-                <a:spcPct val="100000"/>
-              </a:lnSpc>
-              <a:spcBef>
-                <a:spcPct val="20000"/>
-              </a:spcBef>
-              <a:spcAft>
-                <a:spcPts val="600"/>
-              </a:spcAft>
-              <a:buClr>
-                <a:schemeClr val="accent1"/>
-              </a:buClr>
-              <a:buSzPct val="92000"/>
-              <a:buFont typeface="Wingdings 2" panose="05020102010507070707" pitchFamily="18" charset="2"/>
-              <a:buChar char=""/>
-              <a:defRPr sz="1200">
-                <a:solidFill>
-                  <a:schemeClr val="tx1">
-                    <a:lumMod val="75000"/>
-                    <a:lumOff val="25000"/>
-                  </a:schemeClr>
-                </a:solidFill>
-              </a:defRPr>
-            </a:lvl4pPr>
-            <a:lvl5pPr marL="1602000" indent="-234000">
-              <a:lnSpc>
-                <a:spcPct val="100000"/>
-              </a:lnSpc>
-              <a:spcBef>
-                <a:spcPct val="20000"/>
-              </a:spcBef>
-              <a:spcAft>
-                <a:spcPts val="600"/>
-              </a:spcAft>
-              <a:buClr>
-                <a:schemeClr val="accent1"/>
-              </a:buClr>
-              <a:buSzPct val="92000"/>
-              <a:buFont typeface="Wingdings 2" panose="05020102010507070707" pitchFamily="18" charset="2"/>
-              <a:buChar char=""/>
-              <a:defRPr sz="1200">
-                <a:solidFill>
-                  <a:schemeClr val="tx1">
-                    <a:lumMod val="75000"/>
-                    <a:lumOff val="25000"/>
-                  </a:schemeClr>
-                </a:solidFill>
-              </a:defRPr>
-            </a:lvl5pPr>
-            <a:lvl6pPr marL="1900000" indent="-228600">
-              <a:spcBef>
-                <a:spcPct val="20000"/>
-              </a:spcBef>
-              <a:spcAft>
-                <a:spcPts val="600"/>
-              </a:spcAft>
-              <a:buClr>
-                <a:schemeClr val="accent2"/>
-              </a:buClr>
-              <a:buSzPct val="92000"/>
-              <a:buFont typeface="Wingdings 2" panose="05020102010507070707" pitchFamily="18" charset="2"/>
-              <a:buChar char=""/>
-              <a:defRPr sz="1200">
-                <a:solidFill>
-                  <a:schemeClr val="tx2"/>
-                </a:solidFill>
-              </a:defRPr>
-            </a:lvl6pPr>
-            <a:lvl7pPr marL="2200000" indent="-228600">
-              <a:spcBef>
-                <a:spcPct val="20000"/>
-              </a:spcBef>
-              <a:spcAft>
-                <a:spcPts val="600"/>
-              </a:spcAft>
-              <a:buClr>
-                <a:schemeClr val="accent2"/>
-              </a:buClr>
-              <a:buSzPct val="92000"/>
-              <a:buFont typeface="Wingdings 2" panose="05020102010507070707" pitchFamily="18" charset="2"/>
-              <a:buChar char=""/>
-              <a:defRPr sz="1200">
-                <a:solidFill>
-                  <a:schemeClr val="tx2"/>
-                </a:solidFill>
-              </a:defRPr>
-            </a:lvl7pPr>
-            <a:lvl8pPr marL="2500000" indent="-228600">
-              <a:spcBef>
-                <a:spcPct val="20000"/>
-              </a:spcBef>
-              <a:spcAft>
-                <a:spcPts val="600"/>
-              </a:spcAft>
-              <a:buClr>
-                <a:schemeClr val="accent2"/>
-              </a:buClr>
-              <a:buSzPct val="92000"/>
-              <a:buFont typeface="Wingdings 2" panose="05020102010507070707" pitchFamily="18" charset="2"/>
-              <a:buChar char=""/>
-              <a:defRPr sz="1200">
-                <a:solidFill>
-                  <a:schemeClr val="tx2"/>
-                </a:solidFill>
-              </a:defRPr>
-            </a:lvl8pPr>
-            <a:lvl9pPr marL="2800000" indent="-228600">
-              <a:spcBef>
-                <a:spcPct val="20000"/>
-              </a:spcBef>
-              <a:spcAft>
-                <a:spcPts val="600"/>
-              </a:spcAft>
-              <a:buClr>
-                <a:schemeClr val="accent2"/>
-              </a:buClr>
-              <a:buSzPct val="92000"/>
-              <a:buFont typeface="Wingdings 2" panose="05020102010507070707" pitchFamily="18" charset="2"/>
-              <a:buChar char=""/>
-              <a:defRPr sz="1200">
-                <a:solidFill>
-                  <a:schemeClr val="tx2"/>
-                </a:solidFill>
-              </a:defRPr>
-            </a:lvl9pPr>
-          </a:lstStyle>
-          <a:p>
-            <a:endParaRPr lang="en-US" dirty="0"/>
-          </a:p>
-          <a:p>
-            <a:pPr marL="285750" indent="-285750" algn="l">
-              <a:buFont typeface="Wingdings" panose="05000000000000000000" pitchFamily="2" charset="2"/>
-              <a:buChar char="§"/>
-            </a:pPr>
-            <a:r>
-              <a:rPr lang="en-US" dirty="0"/>
-              <a:t>Descriptive analysis (mean, median., </a:t>
-            </a:r>
-            <a:r>
-              <a:rPr lang="en-US" dirty="0" err="1"/>
-              <a:t>etc</a:t>
-            </a:r>
-            <a:r>
-              <a:rPr lang="en-US" dirty="0"/>
-              <a:t>)</a:t>
-            </a:r>
-          </a:p>
-          <a:p>
-            <a:pPr marL="285750" indent="-285750" algn="l">
-              <a:buFont typeface="Wingdings" panose="05000000000000000000" pitchFamily="2" charset="2"/>
-              <a:buChar char="§"/>
-            </a:pPr>
-            <a:r>
-              <a:rPr lang="en-US" dirty="0"/>
-              <a:t>Regression analyses (linear, logistic, </a:t>
-            </a:r>
-            <a:r>
-              <a:rPr lang="en-US" dirty="0" err="1"/>
-              <a:t>ect</a:t>
-            </a:r>
-            <a:r>
-              <a:rPr lang="en-US" dirty="0"/>
-              <a:t>)</a:t>
-            </a:r>
-          </a:p>
-          <a:p>
-            <a:pPr marL="285750" indent="-285750" algn="l">
-              <a:buFont typeface="Wingdings" panose="05000000000000000000" pitchFamily="2" charset="2"/>
-              <a:buChar char="§"/>
-            </a:pPr>
-            <a:r>
-              <a:rPr lang="en-US" dirty="0"/>
-              <a:t>Time series analysis (ARIMA, </a:t>
-            </a:r>
-            <a:r>
-              <a:rPr lang="en-US" dirty="0" err="1"/>
-              <a:t>etc</a:t>
-            </a:r>
-            <a:r>
-              <a:rPr lang="en-US" dirty="0"/>
-              <a:t>)</a:t>
-            </a:r>
-          </a:p>
-          <a:p>
-            <a:pPr marL="285750" indent="-285750" algn="l">
-              <a:buFont typeface="Wingdings" panose="05000000000000000000" pitchFamily="2" charset="2"/>
-              <a:buChar char="§"/>
-            </a:pPr>
-            <a:r>
-              <a:rPr lang="en-US" dirty="0"/>
-              <a:t>Multivariate analysis (PCA, factor analysis)</a:t>
-            </a:r>
-          </a:p>
-          <a:p>
-            <a:pPr marL="285750" indent="-285750" algn="l">
-              <a:buFont typeface="Wingdings" panose="05000000000000000000" pitchFamily="2" charset="2"/>
-              <a:buChar char="§"/>
-            </a:pPr>
-            <a:r>
-              <a:rPr lang="en-US" dirty="0">
-                <a:hlinkClick r:id="rId2"/>
-              </a:rPr>
-              <a:t>A handbook of statistical analysis in R</a:t>
-            </a:r>
-            <a:endParaRPr lang="en-US" dirty="0"/>
-          </a:p>
-        </p:txBody>
-      </p:sp>
-      <p:sp>
-        <p:nvSpPr>
-          <p:cNvPr id="8" name="TextBox 7">
-            <a:extLst>
-              <a:ext uri="{FF2B5EF4-FFF2-40B4-BE49-F238E27FC236}">
-                <a16:creationId xmlns:a16="http://schemas.microsoft.com/office/drawing/2014/main" id="{EBBB5179-0B40-9AE5-22CE-E99EBD4AC387}"/>
-              </a:ext>
-            </a:extLst>
-          </p:cNvPr>
-          <p:cNvSpPr txBox="1"/>
-          <p:nvPr/>
-        </p:nvSpPr>
-        <p:spPr>
-          <a:xfrm>
-            <a:off x="6942665" y="1666281"/>
-            <a:ext cx="3810000" cy="369332"/>
-          </a:xfrm>
-          <a:prstGeom prst="rect">
-            <a:avLst/>
-          </a:prstGeom>
-          <a:noFill/>
-        </p:spPr>
-        <p:txBody>
-          <a:bodyPr wrap="square" rtlCol="0">
-            <a:spAutoFit/>
-          </a:bodyPr>
-          <a:lstStyle/>
-          <a:p>
-            <a:r>
-              <a:rPr lang="en-US" dirty="0"/>
-              <a:t>Geospatial Data Analysis</a:t>
-            </a:r>
-          </a:p>
-        </p:txBody>
-      </p:sp>
-      <p:sp>
-        <p:nvSpPr>
-          <p:cNvPr id="14" name="TextBox 13">
-            <a:extLst>
-              <a:ext uri="{FF2B5EF4-FFF2-40B4-BE49-F238E27FC236}">
-                <a16:creationId xmlns:a16="http://schemas.microsoft.com/office/drawing/2014/main" id="{E595609F-EEA2-A807-0BF2-59572CBE4E12}"/>
-              </a:ext>
-            </a:extLst>
-          </p:cNvPr>
-          <p:cNvSpPr txBox="1"/>
-          <p:nvPr/>
-        </p:nvSpPr>
-        <p:spPr>
-          <a:xfrm>
-            <a:off x="1532467" y="1666281"/>
-            <a:ext cx="1921933" cy="369332"/>
-          </a:xfrm>
-          <a:prstGeom prst="rect">
-            <a:avLst/>
-          </a:prstGeom>
-          <a:noFill/>
-        </p:spPr>
-        <p:txBody>
-          <a:bodyPr wrap="square">
-            <a:spAutoFit/>
-          </a:bodyPr>
-          <a:lstStyle/>
-          <a:p>
-            <a:r>
-              <a:rPr lang="en-US" dirty="0"/>
-              <a:t>Statistical Analysis</a:t>
-            </a:r>
-          </a:p>
-        </p:txBody>
-      </p:sp>
-      <p:sp>
-        <p:nvSpPr>
-          <p:cNvPr id="15" name="TextBox 14">
-            <a:extLst>
-              <a:ext uri="{FF2B5EF4-FFF2-40B4-BE49-F238E27FC236}">
-                <a16:creationId xmlns:a16="http://schemas.microsoft.com/office/drawing/2014/main" id="{D97BA49B-23EC-8730-9EB6-3A359BEE2E74}"/>
-              </a:ext>
-            </a:extLst>
-          </p:cNvPr>
-          <p:cNvSpPr txBox="1"/>
-          <p:nvPr/>
-        </p:nvSpPr>
-        <p:spPr>
-          <a:xfrm>
-            <a:off x="6832599" y="2563894"/>
-            <a:ext cx="3522133" cy="1566222"/>
-          </a:xfrm>
-          <a:prstGeom prst="rect">
-            <a:avLst/>
-          </a:prstGeom>
-        </p:spPr>
-        <p:txBody>
-          <a:bodyPr vert="horz" lIns="91440" tIns="45720" rIns="91440" bIns="45720" rtlCol="0" anchor="ctr">
-            <a:normAutofit/>
-          </a:bodyPr>
-          <a:lstStyle>
-            <a:defPPr>
-              <a:defRPr lang="en-US"/>
-            </a:defPPr>
-            <a:lvl1pPr indent="0" algn="ctr">
-              <a:lnSpc>
-                <a:spcPct val="100000"/>
-              </a:lnSpc>
-              <a:spcBef>
-                <a:spcPct val="20000"/>
-              </a:spcBef>
-              <a:spcAft>
-                <a:spcPts val="600"/>
-              </a:spcAft>
-              <a:buClr>
-                <a:schemeClr val="accent1"/>
-              </a:buClr>
-              <a:buSzPct val="92000"/>
-              <a:buFont typeface="Wingdings 2" panose="05020102010507070707" pitchFamily="18" charset="2"/>
-              <a:buNone/>
-              <a:defRPr>
-                <a:solidFill>
-                  <a:schemeClr val="tx1">
-                    <a:lumMod val="75000"/>
-                    <a:lumOff val="25000"/>
-                  </a:schemeClr>
-                </a:solidFill>
-              </a:defRPr>
-            </a:lvl1pPr>
-            <a:lvl2pPr marL="630000" indent="-306000">
-              <a:lnSpc>
-                <a:spcPct val="100000"/>
-              </a:lnSpc>
-              <a:spcBef>
-                <a:spcPct val="20000"/>
-              </a:spcBef>
-              <a:spcAft>
-                <a:spcPts val="600"/>
-              </a:spcAft>
-              <a:buClr>
-                <a:schemeClr val="accent1"/>
-              </a:buClr>
-              <a:buSzPct val="92000"/>
-              <a:buFont typeface="Wingdings 2" panose="05020102010507070707" pitchFamily="18" charset="2"/>
-              <a:buChar char=""/>
-              <a:defRPr sz="1600">
-                <a:solidFill>
-                  <a:schemeClr val="tx1">
-                    <a:lumMod val="75000"/>
-                    <a:lumOff val="25000"/>
-                  </a:schemeClr>
-                </a:solidFill>
-              </a:defRPr>
-            </a:lvl2pPr>
-            <a:lvl3pPr marL="900000" indent="-270000">
-              <a:lnSpc>
-                <a:spcPct val="100000"/>
-              </a:lnSpc>
-              <a:spcBef>
-                <a:spcPct val="20000"/>
-              </a:spcBef>
-              <a:spcAft>
-                <a:spcPts val="600"/>
-              </a:spcAft>
-              <a:buClr>
-                <a:schemeClr val="accent1"/>
-              </a:buClr>
-              <a:buSzPct val="92000"/>
-              <a:buFont typeface="Wingdings 2" panose="05020102010507070707" pitchFamily="18" charset="2"/>
-              <a:buChar char=""/>
-              <a:defRPr sz="1400">
-                <a:solidFill>
-                  <a:schemeClr val="tx1">
-                    <a:lumMod val="75000"/>
-                    <a:lumOff val="25000"/>
-                  </a:schemeClr>
-                </a:solidFill>
-              </a:defRPr>
-            </a:lvl3pPr>
-            <a:lvl4pPr marL="1242000" indent="-234000">
-              <a:lnSpc>
-                <a:spcPct val="100000"/>
-              </a:lnSpc>
-              <a:spcBef>
-                <a:spcPct val="20000"/>
-              </a:spcBef>
-              <a:spcAft>
-                <a:spcPts val="600"/>
-              </a:spcAft>
-              <a:buClr>
-                <a:schemeClr val="accent1"/>
-              </a:buClr>
-              <a:buSzPct val="92000"/>
-              <a:buFont typeface="Wingdings 2" panose="05020102010507070707" pitchFamily="18" charset="2"/>
-              <a:buChar char=""/>
-              <a:defRPr sz="1200">
-                <a:solidFill>
-                  <a:schemeClr val="tx1">
-                    <a:lumMod val="75000"/>
-                    <a:lumOff val="25000"/>
-                  </a:schemeClr>
-                </a:solidFill>
-              </a:defRPr>
-            </a:lvl4pPr>
-            <a:lvl5pPr marL="1602000" indent="-234000">
-              <a:lnSpc>
-                <a:spcPct val="100000"/>
-              </a:lnSpc>
-              <a:spcBef>
-                <a:spcPct val="20000"/>
-              </a:spcBef>
-              <a:spcAft>
-                <a:spcPts val="600"/>
-              </a:spcAft>
-              <a:buClr>
-                <a:schemeClr val="accent1"/>
-              </a:buClr>
-              <a:buSzPct val="92000"/>
-              <a:buFont typeface="Wingdings 2" panose="05020102010507070707" pitchFamily="18" charset="2"/>
-              <a:buChar char=""/>
-              <a:defRPr sz="1200">
-                <a:solidFill>
-                  <a:schemeClr val="tx1">
-                    <a:lumMod val="75000"/>
-                    <a:lumOff val="25000"/>
-                  </a:schemeClr>
-                </a:solidFill>
-              </a:defRPr>
-            </a:lvl5pPr>
-            <a:lvl6pPr marL="1900000" indent="-228600">
-              <a:spcBef>
-                <a:spcPct val="20000"/>
-              </a:spcBef>
-              <a:spcAft>
-                <a:spcPts val="600"/>
-              </a:spcAft>
-              <a:buClr>
-                <a:schemeClr val="accent2"/>
-              </a:buClr>
-              <a:buSzPct val="92000"/>
-              <a:buFont typeface="Wingdings 2" panose="05020102010507070707" pitchFamily="18" charset="2"/>
-              <a:buChar char=""/>
-              <a:defRPr sz="1200">
-                <a:solidFill>
-                  <a:schemeClr val="tx2"/>
-                </a:solidFill>
-              </a:defRPr>
-            </a:lvl6pPr>
-            <a:lvl7pPr marL="2200000" indent="-228600">
-              <a:spcBef>
-                <a:spcPct val="20000"/>
-              </a:spcBef>
-              <a:spcAft>
-                <a:spcPts val="600"/>
-              </a:spcAft>
-              <a:buClr>
-                <a:schemeClr val="accent2"/>
-              </a:buClr>
-              <a:buSzPct val="92000"/>
-              <a:buFont typeface="Wingdings 2" panose="05020102010507070707" pitchFamily="18" charset="2"/>
-              <a:buChar char=""/>
-              <a:defRPr sz="1200">
-                <a:solidFill>
-                  <a:schemeClr val="tx2"/>
-                </a:solidFill>
-              </a:defRPr>
-            </a:lvl7pPr>
-            <a:lvl8pPr marL="2500000" indent="-228600">
-              <a:spcBef>
-                <a:spcPct val="20000"/>
-              </a:spcBef>
-              <a:spcAft>
-                <a:spcPts val="600"/>
-              </a:spcAft>
-              <a:buClr>
-                <a:schemeClr val="accent2"/>
-              </a:buClr>
-              <a:buSzPct val="92000"/>
-              <a:buFont typeface="Wingdings 2" panose="05020102010507070707" pitchFamily="18" charset="2"/>
-              <a:buChar char=""/>
-              <a:defRPr sz="1200">
-                <a:solidFill>
-                  <a:schemeClr val="tx2"/>
-                </a:solidFill>
-              </a:defRPr>
-            </a:lvl8pPr>
-            <a:lvl9pPr marL="2800000" indent="-228600">
-              <a:spcBef>
-                <a:spcPct val="20000"/>
-              </a:spcBef>
-              <a:spcAft>
-                <a:spcPts val="600"/>
-              </a:spcAft>
-              <a:buClr>
-                <a:schemeClr val="accent2"/>
-              </a:buClr>
-              <a:buSzPct val="92000"/>
-              <a:buFont typeface="Wingdings 2" panose="05020102010507070707" pitchFamily="18" charset="2"/>
-              <a:buChar char=""/>
-              <a:defRPr sz="1200">
-                <a:solidFill>
-                  <a:schemeClr val="tx2"/>
-                </a:solidFill>
-              </a:defRPr>
-            </a:lvl9pPr>
-          </a:lstStyle>
-          <a:p>
-            <a:pPr marL="285750" indent="-285750" algn="l">
-              <a:buFont typeface="Wingdings" panose="05000000000000000000" pitchFamily="2" charset="2"/>
-              <a:buChar char="§"/>
-            </a:pPr>
-            <a:r>
-              <a:rPr lang="en-US" dirty="0"/>
-              <a:t>Handle raster and vector data</a:t>
-            </a:r>
-          </a:p>
-          <a:p>
-            <a:pPr marL="285750" indent="-285750" algn="l">
-              <a:buFont typeface="Wingdings" panose="05000000000000000000" pitchFamily="2" charset="2"/>
-              <a:buChar char="§"/>
-            </a:pPr>
-            <a:r>
-              <a:rPr lang="en-US" dirty="0"/>
-              <a:t>Analyze spatial data with sf, </a:t>
-            </a:r>
-            <a:r>
-              <a:rPr lang="en-US" dirty="0" err="1"/>
-              <a:t>sp</a:t>
-            </a:r>
-            <a:r>
-              <a:rPr lang="en-US" dirty="0"/>
-              <a:t> or raster</a:t>
-            </a:r>
-          </a:p>
-          <a:p>
-            <a:pPr marL="285750" indent="-285750">
-              <a:buFont typeface="Wingdings" panose="05000000000000000000" pitchFamily="2" charset="2"/>
-              <a:buChar char="§"/>
-            </a:pPr>
-            <a:endParaRPr lang="en-US" dirty="0"/>
-          </a:p>
-        </p:txBody>
-      </p:sp>
-    </p:spTree>
-    <p:extLst>
-      <p:ext uri="{BB962C8B-B14F-4D97-AF65-F5344CB8AC3E}">
-        <p14:creationId xmlns:p14="http://schemas.microsoft.com/office/powerpoint/2010/main" val="2712390012"/>
-      </p:ext>
-    </p:extLst>
-  </p:cSld>
-  <p:clrMapOvr>
-    <a:masterClrMapping/>
-  </p:clrMapOvr>
-</p:sld>
-</file>
-
-<file path=ppt/slides/slide5.xml><?xml version="1.0" encoding="utf-8"?>
-<p:sld xmlns:a="http://schemas.openxmlformats.org/drawingml/2006/main" xmlns:r="http://schemas.openxmlformats.org/officeDocument/2006/relationships" xmlns:p="http://schemas.openxmlformats.org/presentationml/2006/main">
-  <p:cSld>
-    <p:spTree>
-      <p:nvGrpSpPr>
-        <p:cNvPr id="1" name=""/>
-        <p:cNvGrpSpPr/>
-        <p:nvPr/>
-      </p:nvGrpSpPr>
-      <p:grpSpPr>
-        <a:xfrm>
-          <a:off x="0" y="0"/>
-          <a:ext cx="0" cy="0"/>
-          <a:chOff x="0" y="0"/>
-          <a:chExt cx="0" cy="0"/>
-        </a:xfrm>
-      </p:grpSpPr>
-      <p:sp>
-        <p:nvSpPr>
-          <p:cNvPr id="2" name="Title 1">
-            <a:extLst>
-              <a:ext uri="{FF2B5EF4-FFF2-40B4-BE49-F238E27FC236}">
-                <a16:creationId xmlns:a16="http://schemas.microsoft.com/office/drawing/2014/main" id="{08E5C2BE-4B03-D4E6-DFE7-810B47CD22B5}"/>
-              </a:ext>
-            </a:extLst>
-          </p:cNvPr>
-          <p:cNvSpPr>
-            <a:spLocks noGrp="1"/>
-          </p:cNvSpPr>
-          <p:nvPr>
-            <p:ph type="title"/>
-          </p:nvPr>
-        </p:nvSpPr>
-        <p:spPr>
-          <a:xfrm>
-            <a:off x="581192" y="702156"/>
-            <a:ext cx="11029616" cy="542444"/>
-          </a:xfrm>
-        </p:spPr>
-        <p:txBody>
-          <a:bodyPr/>
-          <a:lstStyle/>
-          <a:p>
-            <a:r>
-              <a:rPr lang="en-US" dirty="0"/>
-              <a:t>R - Introduction</a:t>
-            </a:r>
-          </a:p>
-        </p:txBody>
-      </p:sp>
-      <p:sp>
-        <p:nvSpPr>
-          <p:cNvPr id="4" name="Content Placeholder 3">
-            <a:extLst>
-              <a:ext uri="{FF2B5EF4-FFF2-40B4-BE49-F238E27FC236}">
-                <a16:creationId xmlns:a16="http://schemas.microsoft.com/office/drawing/2014/main" id="{618C42D4-80EE-B95F-F8EC-712863166656}"/>
-              </a:ext>
-            </a:extLst>
-          </p:cNvPr>
-          <p:cNvSpPr txBox="1">
-            <a:spLocks noGrp="1"/>
-          </p:cNvSpPr>
-          <p:nvPr>
-            <p:ph idx="1"/>
-          </p:nvPr>
-        </p:nvSpPr>
-        <p:spPr>
-          <a:xfrm>
-            <a:off x="1309325" y="2014364"/>
-            <a:ext cx="8105775" cy="2416046"/>
-          </a:xfrm>
-          <a:prstGeom prst="rect">
-            <a:avLst/>
-          </a:prstGeom>
-        </p:spPr>
-        <p:txBody>
-          <a:bodyPr vert="horz" lIns="91440" tIns="45720" rIns="91440" bIns="45720" rtlCol="0" anchor="ctr">
-            <a:normAutofit lnSpcReduction="10000"/>
-          </a:bodyPr>
-          <a:lstStyle/>
-          <a:p>
-            <a:pPr marL="0" indent="0" algn="ctr">
-              <a:buNone/>
-            </a:pPr>
-            <a:r>
-              <a:rPr lang="en-US" sz="2400" dirty="0"/>
-              <a:t>Machine Learning</a:t>
-            </a:r>
-          </a:p>
-          <a:p>
-            <a:pPr marL="0" indent="0" algn="ctr">
-              <a:buNone/>
-            </a:pPr>
-            <a:endParaRPr lang="en-US" dirty="0"/>
-          </a:p>
-          <a:p>
-            <a:pPr>
-              <a:buFont typeface="Wingdings" panose="05000000000000000000" pitchFamily="2" charset="2"/>
-              <a:buChar char="§"/>
-            </a:pPr>
-            <a:r>
-              <a:rPr lang="en-US" dirty="0"/>
-              <a:t>Implement supervised learning (classification, regression).</a:t>
-            </a:r>
-          </a:p>
-          <a:p>
-            <a:pPr>
-              <a:buFont typeface="Wingdings" panose="05000000000000000000" pitchFamily="2" charset="2"/>
-              <a:buChar char="§"/>
-            </a:pPr>
-            <a:r>
-              <a:rPr lang="en-US" dirty="0"/>
-              <a:t>Apply unsupervised learning (clustering, dimensionality reduction).</a:t>
-            </a:r>
-          </a:p>
-          <a:p>
-            <a:pPr>
-              <a:buFont typeface="Wingdings" panose="05000000000000000000" pitchFamily="2" charset="2"/>
-              <a:buChar char="§"/>
-            </a:pPr>
-            <a:r>
-              <a:rPr lang="en-US" dirty="0"/>
-              <a:t>Perform deep learning with packages like </a:t>
-            </a:r>
-            <a:r>
-              <a:rPr lang="en-US" dirty="0" err="1"/>
-              <a:t>keras</a:t>
-            </a:r>
-            <a:r>
-              <a:rPr lang="en-US" dirty="0"/>
-              <a:t> or torch.</a:t>
-            </a:r>
-          </a:p>
-          <a:p>
-            <a:pPr>
-              <a:buFont typeface="Wingdings" panose="05000000000000000000" pitchFamily="2" charset="2"/>
-              <a:buChar char="§"/>
-            </a:pPr>
-            <a:r>
-              <a:rPr lang="en-US" dirty="0"/>
-              <a:t>Evaluate models using cross-validation and other metrics.</a:t>
-            </a:r>
-          </a:p>
-        </p:txBody>
-      </p:sp>
-    </p:spTree>
-    <p:extLst>
-      <p:ext uri="{BB962C8B-B14F-4D97-AF65-F5344CB8AC3E}">
-        <p14:creationId xmlns:p14="http://schemas.microsoft.com/office/powerpoint/2010/main" val="478509582"/>
-      </p:ext>
-    </p:extLst>
-  </p:cSld>
-  <p:clrMapOvr>
-    <a:masterClrMapping/>
-  </p:clrMapOvr>
-</p:sld>
-</file>
-
-<file path=ppt/slides/slide6.xml><?xml version="1.0" encoding="utf-8"?>
-<p:sld xmlns:a="http://schemas.openxmlformats.org/drawingml/2006/main" xmlns:r="http://schemas.openxmlformats.org/officeDocument/2006/relationships" xmlns:p="http://schemas.openxmlformats.org/presentationml/2006/main">
-  <p:cSld>
-    <p:spTree>
-      <p:nvGrpSpPr>
-        <p:cNvPr id="1" name=""/>
-        <p:cNvGrpSpPr/>
-        <p:nvPr/>
-      </p:nvGrpSpPr>
-      <p:grpSpPr>
-        <a:xfrm>
-          <a:off x="0" y="0"/>
-          <a:ext cx="0" cy="0"/>
-          <a:chOff x="0" y="0"/>
-          <a:chExt cx="0" cy="0"/>
-        </a:xfrm>
-      </p:grpSpPr>
-      <p:sp>
-        <p:nvSpPr>
-          <p:cNvPr id="2" name="Title 1">
-            <a:extLst>
-              <a:ext uri="{FF2B5EF4-FFF2-40B4-BE49-F238E27FC236}">
-                <a16:creationId xmlns:a16="http://schemas.microsoft.com/office/drawing/2014/main" id="{A6A84645-B522-99BF-18B8-9B3461D1AF2F}"/>
-              </a:ext>
-            </a:extLst>
-          </p:cNvPr>
-          <p:cNvSpPr>
-            <a:spLocks noGrp="1"/>
-          </p:cNvSpPr>
-          <p:nvPr>
-            <p:ph type="title"/>
-          </p:nvPr>
-        </p:nvSpPr>
-        <p:spPr>
-          <a:xfrm>
-            <a:off x="581192" y="702156"/>
-            <a:ext cx="11029616" cy="593244"/>
-          </a:xfrm>
-        </p:spPr>
-        <p:txBody>
-          <a:bodyPr/>
-          <a:lstStyle/>
-          <a:p>
-            <a:r>
-              <a:rPr lang="en-US" dirty="0" err="1"/>
-              <a:t>Rstudio</a:t>
-            </a:r>
-            <a:r>
-              <a:rPr lang="en-US" dirty="0"/>
-              <a:t> - introduction</a:t>
-            </a:r>
-          </a:p>
-        </p:txBody>
-      </p:sp>
-      <p:sp>
-        <p:nvSpPr>
-          <p:cNvPr id="3" name="Content Placeholder 2">
-            <a:extLst>
-              <a:ext uri="{FF2B5EF4-FFF2-40B4-BE49-F238E27FC236}">
-                <a16:creationId xmlns:a16="http://schemas.microsoft.com/office/drawing/2014/main" id="{8471809F-C3C0-E273-A913-956504C5CFA4}"/>
-              </a:ext>
-            </a:extLst>
-          </p:cNvPr>
-          <p:cNvSpPr>
-            <a:spLocks noGrp="1"/>
-          </p:cNvSpPr>
-          <p:nvPr>
-            <p:ph idx="1"/>
-          </p:nvPr>
-        </p:nvSpPr>
-        <p:spPr/>
-        <p:txBody>
-          <a:bodyPr/>
-          <a:lstStyle/>
-          <a:p>
-            <a:endParaRPr lang="en-US"/>
-          </a:p>
-        </p:txBody>
-      </p:sp>
-    </p:spTree>
-    <p:extLst>
-      <p:ext uri="{BB962C8B-B14F-4D97-AF65-F5344CB8AC3E}">
-        <p14:creationId xmlns:p14="http://schemas.microsoft.com/office/powerpoint/2010/main" val="630793298"/>
-      </p:ext>
-    </p:extLst>
-  </p:cSld>
-  <p:clrMapOvr>
-    <a:masterClrMapping/>
-  </p:clrMapOvr>
-</p:sld>
-</file>
-
-<file path=ppt/slides/slide7.xml><?xml version="1.0" encoding="utf-8"?>
-<p:sld xmlns:a="http://schemas.openxmlformats.org/drawingml/2006/main" xmlns:r="http://schemas.openxmlformats.org/officeDocument/2006/relationships" xmlns:p="http://schemas.openxmlformats.org/presentationml/2006/main">
-  <p:cSld>
-    <p:spTree>
-      <p:nvGrpSpPr>
-        <p:cNvPr id="1" name=""/>
-        <p:cNvGrpSpPr/>
-        <p:nvPr/>
-      </p:nvGrpSpPr>
-      <p:grpSpPr>
-        <a:xfrm>
-          <a:off x="0" y="0"/>
-          <a:ext cx="0" cy="0"/>
-          <a:chOff x="0" y="0"/>
-          <a:chExt cx="0" cy="0"/>
-        </a:xfrm>
-      </p:grpSpPr>
-      <p:sp>
-        <p:nvSpPr>
-          <p:cNvPr id="2" name="Title 1">
-            <a:extLst>
-              <a:ext uri="{FF2B5EF4-FFF2-40B4-BE49-F238E27FC236}">
-                <a16:creationId xmlns:a16="http://schemas.microsoft.com/office/drawing/2014/main" id="{D3288A91-2B12-48EA-0F3D-463392701478}"/>
-              </a:ext>
-            </a:extLst>
-          </p:cNvPr>
-          <p:cNvSpPr>
-            <a:spLocks noGrp="1"/>
-          </p:cNvSpPr>
-          <p:nvPr>
-            <p:ph type="title"/>
-          </p:nvPr>
-        </p:nvSpPr>
-        <p:spPr/>
-        <p:txBody>
-          <a:bodyPr/>
-          <a:lstStyle/>
-          <a:p>
-            <a:endParaRPr lang="en-US"/>
-          </a:p>
-        </p:txBody>
-      </p:sp>
-      <p:sp>
-        <p:nvSpPr>
-          <p:cNvPr id="3" name="Content Placeholder 2">
-            <a:extLst>
-              <a:ext uri="{FF2B5EF4-FFF2-40B4-BE49-F238E27FC236}">
-                <a16:creationId xmlns:a16="http://schemas.microsoft.com/office/drawing/2014/main" id="{B2522736-1C8F-D258-ECC8-5331837B4268}"/>
-              </a:ext>
-            </a:extLst>
-          </p:cNvPr>
-          <p:cNvSpPr>
-            <a:spLocks noGrp="1"/>
-          </p:cNvSpPr>
-          <p:nvPr>
-            <p:ph idx="1"/>
-          </p:nvPr>
-        </p:nvSpPr>
-        <p:spPr/>
-        <p:txBody>
-          <a:bodyPr/>
-          <a:lstStyle/>
-          <a:p>
-            <a:endParaRPr lang="en-US"/>
-          </a:p>
-        </p:txBody>
-      </p:sp>
-    </p:spTree>
-    <p:extLst>
-      <p:ext uri="{BB962C8B-B14F-4D97-AF65-F5344CB8AC3E}">
-        <p14:creationId xmlns:p14="http://schemas.microsoft.com/office/powerpoint/2010/main" val="2216533061"/>
-      </p:ext>
-    </p:extLst>
-  </p:cSld>
-  <p:clrMapOvr>
-    <a:masterClrMapping/>
-  </p:clrMapOvr>
-</p:sld>
-</file>
-
-<file path=ppt/slides/slide8.xml><?xml version="1.0" encoding="utf-8"?>
-<p:sld xmlns:a="http://schemas.openxmlformats.org/drawingml/2006/main" xmlns:r="http://schemas.openxmlformats.org/officeDocument/2006/relationships" xmlns:p="http://schemas.openxmlformats.org/presentationml/2006/main">
-  <p:cSld>
-    <p:spTree>
-      <p:nvGrpSpPr>
-        <p:cNvPr id="1" name=""/>
-        <p:cNvGrpSpPr/>
-        <p:nvPr/>
-      </p:nvGrpSpPr>
-      <p:grpSpPr>
-        <a:xfrm>
-          <a:off x="0" y="0"/>
-          <a:ext cx="0" cy="0"/>
-          <a:chOff x="0" y="0"/>
-          <a:chExt cx="0" cy="0"/>
-        </a:xfrm>
-      </p:grpSpPr>
-      <p:sp>
-        <p:nvSpPr>
-          <p:cNvPr id="2" name="Title 1">
-            <a:extLst>
-              <a:ext uri="{FF2B5EF4-FFF2-40B4-BE49-F238E27FC236}">
                 <a16:creationId xmlns:a16="http://schemas.microsoft.com/office/drawing/2014/main" id="{91B9B59A-6EC4-6EAE-D3AF-759C6AE8B9EA}"/>
               </a:ext>
             </a:extLst>
@@ -6177,7 +4389,7 @@
 </p:sld>
 </file>
 
-<file path=ppt/slides/slide9.xml><?xml version="1.0" encoding="utf-8"?>
+<file path=ppt/slides/slide4.xml><?xml version="1.0" encoding="utf-8"?>
 <p:sld xmlns:a="http://schemas.openxmlformats.org/drawingml/2006/main" xmlns:r="http://schemas.openxmlformats.org/officeDocument/2006/relationships" xmlns:p="http://schemas.openxmlformats.org/presentationml/2006/main">
   <p:cSld>
     <p:spTree>

</xml_diff>